<commit_message>
proyecto: limpieza codigo y archivos
</commit_message>
<xml_diff>
--- a/docs/diagramas/ben linus.pptx
+++ b/docs/diagramas/ben linus.pptx
@@ -104,6 +104,11 @@
       </a:defRPr>
     </a:lvl9pPr>
   </p:defaultTextStyle>
+  <p:extLst>
+    <p:ext uri="{EFAFB233-063F-42B5-8137-9DF3F51BA10A}">
+      <p15:sldGuideLst xmlns:p15="http://schemas.microsoft.com/office/powerpoint/2012/main"/>
+    </p:ext>
+  </p:extLst>
 </p:presentation>
 </file>
 
@@ -149,6 +154,94 @@
       </pc:sldChg>
     </pc:docChg>
   </pc:docChgLst>
+  <pc:docChgLst>
+    <pc:chgData name="Alonso Serrano" userId="50a2dc25c595da3a" providerId="LiveId" clId="{A0A34D5A-FC58-46DA-946F-3D8AC3829867}"/>
+    <pc:docChg chg="modSld">
+      <pc:chgData name="Alonso Serrano" userId="50a2dc25c595da3a" providerId="LiveId" clId="{A0A34D5A-FC58-46DA-946F-3D8AC3829867}" dt="2018-04-17T19:44:53.671" v="43" actId="1076"/>
+      <pc:docMkLst>
+        <pc:docMk/>
+      </pc:docMkLst>
+      <pc:sldChg chg="modSp">
+        <pc:chgData name="Alonso Serrano" userId="50a2dc25c595da3a" providerId="LiveId" clId="{A0A34D5A-FC58-46DA-946F-3D8AC3829867}" dt="2018-04-17T19:44:53.671" v="43" actId="1076"/>
+        <pc:sldMkLst>
+          <pc:docMk/>
+          <pc:sldMk cId="2418213532" sldId="256"/>
+        </pc:sldMkLst>
+        <pc:picChg chg="mod">
+          <ac:chgData name="Alonso Serrano" userId="50a2dc25c595da3a" providerId="LiveId" clId="{A0A34D5A-FC58-46DA-946F-3D8AC3829867}" dt="2018-04-17T19:44:38.574" v="36" actId="1076"/>
+          <ac:picMkLst>
+            <pc:docMk/>
+            <pc:sldMk cId="2418213532" sldId="256"/>
+            <ac:picMk id="5" creationId="{BA815E38-C4CF-4EBA-9C48-9AFF0C9262B5}"/>
+          </ac:picMkLst>
+        </pc:picChg>
+        <pc:picChg chg="mod">
+          <ac:chgData name="Alonso Serrano" userId="50a2dc25c595da3a" providerId="LiveId" clId="{A0A34D5A-FC58-46DA-946F-3D8AC3829867}" dt="2018-04-17T19:44:51.119" v="42" actId="1076"/>
+          <ac:picMkLst>
+            <pc:docMk/>
+            <pc:sldMk cId="2418213532" sldId="256"/>
+            <ac:picMk id="7" creationId="{3BF88F23-40B9-4F3C-BFBF-7F264ED4618C}"/>
+          </ac:picMkLst>
+        </pc:picChg>
+        <pc:picChg chg="mod">
+          <ac:chgData name="Alonso Serrano" userId="50a2dc25c595da3a" providerId="LiveId" clId="{A0A34D5A-FC58-46DA-946F-3D8AC3829867}" dt="2018-04-17T19:44:41.974" v="37" actId="1076"/>
+          <ac:picMkLst>
+            <pc:docMk/>
+            <pc:sldMk cId="2418213532" sldId="256"/>
+            <ac:picMk id="9" creationId="{C4CE8832-9842-4026-8FDC-F39C50DC441F}"/>
+          </ac:picMkLst>
+        </pc:picChg>
+        <pc:picChg chg="mod">
+          <ac:chgData name="Alonso Serrano" userId="50a2dc25c595da3a" providerId="LiveId" clId="{A0A34D5A-FC58-46DA-946F-3D8AC3829867}" dt="2018-04-17T19:44:18.157" v="27" actId="1076"/>
+          <ac:picMkLst>
+            <pc:docMk/>
+            <pc:sldMk cId="2418213532" sldId="256"/>
+            <ac:picMk id="11" creationId="{0C35FDC8-7579-494F-9E9B-DF66580FE447}"/>
+          </ac:picMkLst>
+        </pc:picChg>
+        <pc:picChg chg="mod">
+          <ac:chgData name="Alonso Serrano" userId="50a2dc25c595da3a" providerId="LiveId" clId="{A0A34D5A-FC58-46DA-946F-3D8AC3829867}" dt="2018-04-17T19:44:12.373" v="25" actId="1076"/>
+          <ac:picMkLst>
+            <pc:docMk/>
+            <pc:sldMk cId="2418213532" sldId="256"/>
+            <ac:picMk id="13" creationId="{B64DE293-E101-4541-A762-B7EC54B75B77}"/>
+          </ac:picMkLst>
+        </pc:picChg>
+        <pc:picChg chg="mod">
+          <ac:chgData name="Alonso Serrano" userId="50a2dc25c595da3a" providerId="LiveId" clId="{A0A34D5A-FC58-46DA-946F-3D8AC3829867}" dt="2018-04-17T19:44:45.054" v="39" actId="1076"/>
+          <ac:picMkLst>
+            <pc:docMk/>
+            <pc:sldMk cId="2418213532" sldId="256"/>
+            <ac:picMk id="15" creationId="{378EC11A-B589-4CCF-A7AF-39FF09DCFCBD}"/>
+          </ac:picMkLst>
+        </pc:picChg>
+        <pc:picChg chg="mod">
+          <ac:chgData name="Alonso Serrano" userId="50a2dc25c595da3a" providerId="LiveId" clId="{A0A34D5A-FC58-46DA-946F-3D8AC3829867}" dt="2018-04-17T19:43:10.864" v="4" actId="1076"/>
+          <ac:picMkLst>
+            <pc:docMk/>
+            <pc:sldMk cId="2418213532" sldId="256"/>
+            <ac:picMk id="17" creationId="{B8FEB4EF-6329-44B8-8FDC-765E60951046}"/>
+          </ac:picMkLst>
+        </pc:picChg>
+        <pc:picChg chg="mod">
+          <ac:chgData name="Alonso Serrano" userId="50a2dc25c595da3a" providerId="LiveId" clId="{A0A34D5A-FC58-46DA-946F-3D8AC3829867}" dt="2018-04-17T19:44:53.671" v="43" actId="1076"/>
+          <ac:picMkLst>
+            <pc:docMk/>
+            <pc:sldMk cId="2418213532" sldId="256"/>
+            <ac:picMk id="19" creationId="{0FEF648A-F86D-420E-A9AC-552C122BC221}"/>
+          </ac:picMkLst>
+        </pc:picChg>
+        <pc:picChg chg="mod">
+          <ac:chgData name="Alonso Serrano" userId="50a2dc25c595da3a" providerId="LiveId" clId="{A0A34D5A-FC58-46DA-946F-3D8AC3829867}" dt="2018-04-17T19:44:06.692" v="23" actId="1076"/>
+          <ac:picMkLst>
+            <pc:docMk/>
+            <pc:sldMk cId="2418213532" sldId="256"/>
+            <ac:picMk id="21" creationId="{575C37E9-458A-45C6-B493-AEC09A4CF51F}"/>
+          </ac:picMkLst>
+        </pc:picChg>
+      </pc:sldChg>
+    </pc:docChg>
+  </pc:docChgLst>
 </pc:chgInfo>
 </file>
 
@@ -299,7 +392,7 @@
           <a:p>
             <a:fld id="{149A0BCC-0785-4118-B7C3-57F18FC28863}" type="datetimeFigureOut">
               <a:rPr lang="es-ES" smtClean="0"/>
-              <a:t>27/03/2018</a:t>
+              <a:t>17/04/2018</a:t>
             </a:fld>
             <a:endParaRPr lang="es-ES"/>
           </a:p>
@@ -497,7 +590,7 @@
           <a:p>
             <a:fld id="{149A0BCC-0785-4118-B7C3-57F18FC28863}" type="datetimeFigureOut">
               <a:rPr lang="es-ES" smtClean="0"/>
-              <a:t>27/03/2018</a:t>
+              <a:t>17/04/2018</a:t>
             </a:fld>
             <a:endParaRPr lang="es-ES"/>
           </a:p>
@@ -705,7 +798,7 @@
           <a:p>
             <a:fld id="{149A0BCC-0785-4118-B7C3-57F18FC28863}" type="datetimeFigureOut">
               <a:rPr lang="es-ES" smtClean="0"/>
-              <a:t>27/03/2018</a:t>
+              <a:t>17/04/2018</a:t>
             </a:fld>
             <a:endParaRPr lang="es-ES"/>
           </a:p>
@@ -903,7 +996,7 @@
           <a:p>
             <a:fld id="{149A0BCC-0785-4118-B7C3-57F18FC28863}" type="datetimeFigureOut">
               <a:rPr lang="es-ES" smtClean="0"/>
-              <a:t>27/03/2018</a:t>
+              <a:t>17/04/2018</a:t>
             </a:fld>
             <a:endParaRPr lang="es-ES"/>
           </a:p>
@@ -1178,7 +1271,7 @@
           <a:p>
             <a:fld id="{149A0BCC-0785-4118-B7C3-57F18FC28863}" type="datetimeFigureOut">
               <a:rPr lang="es-ES" smtClean="0"/>
-              <a:t>27/03/2018</a:t>
+              <a:t>17/04/2018</a:t>
             </a:fld>
             <a:endParaRPr lang="es-ES"/>
           </a:p>
@@ -1443,7 +1536,7 @@
           <a:p>
             <a:fld id="{149A0BCC-0785-4118-B7C3-57F18FC28863}" type="datetimeFigureOut">
               <a:rPr lang="es-ES" smtClean="0"/>
-              <a:t>27/03/2018</a:t>
+              <a:t>17/04/2018</a:t>
             </a:fld>
             <a:endParaRPr lang="es-ES"/>
           </a:p>
@@ -1855,7 +1948,7 @@
           <a:p>
             <a:fld id="{149A0BCC-0785-4118-B7C3-57F18FC28863}" type="datetimeFigureOut">
               <a:rPr lang="es-ES" smtClean="0"/>
-              <a:t>27/03/2018</a:t>
+              <a:t>17/04/2018</a:t>
             </a:fld>
             <a:endParaRPr lang="es-ES"/>
           </a:p>
@@ -1996,7 +2089,7 @@
           <a:p>
             <a:fld id="{149A0BCC-0785-4118-B7C3-57F18FC28863}" type="datetimeFigureOut">
               <a:rPr lang="es-ES" smtClean="0"/>
-              <a:t>27/03/2018</a:t>
+              <a:t>17/04/2018</a:t>
             </a:fld>
             <a:endParaRPr lang="es-ES"/>
           </a:p>
@@ -2109,7 +2202,7 @@
           <a:p>
             <a:fld id="{149A0BCC-0785-4118-B7C3-57F18FC28863}" type="datetimeFigureOut">
               <a:rPr lang="es-ES" smtClean="0"/>
-              <a:t>27/03/2018</a:t>
+              <a:t>17/04/2018</a:t>
             </a:fld>
             <a:endParaRPr lang="es-ES"/>
           </a:p>
@@ -2420,7 +2513,7 @@
           <a:p>
             <a:fld id="{149A0BCC-0785-4118-B7C3-57F18FC28863}" type="datetimeFigureOut">
               <a:rPr lang="es-ES" smtClean="0"/>
-              <a:t>27/03/2018</a:t>
+              <a:t>17/04/2018</a:t>
             </a:fld>
             <a:endParaRPr lang="es-ES"/>
           </a:p>
@@ -2708,7 +2801,7 @@
           <a:p>
             <a:fld id="{149A0BCC-0785-4118-B7C3-57F18FC28863}" type="datetimeFigureOut">
               <a:rPr lang="es-ES" smtClean="0"/>
-              <a:t>27/03/2018</a:t>
+              <a:t>17/04/2018</a:t>
             </a:fld>
             <a:endParaRPr lang="es-ES"/>
           </a:p>
@@ -2949,7 +3042,7 @@
           <a:p>
             <a:fld id="{149A0BCC-0785-4118-B7C3-57F18FC28863}" type="datetimeFigureOut">
               <a:rPr lang="es-ES" smtClean="0"/>
-              <a:t>27/03/2018</a:t>
+              <a:t>17/04/2018</a:t>
             </a:fld>
             <a:endParaRPr lang="es-ES"/>
           </a:p>
@@ -3394,7 +3487,7 @@
         </p:blipFill>
         <p:spPr>
           <a:xfrm>
-            <a:off x="3776496" y="0"/>
+            <a:off x="3718031" y="219148"/>
             <a:ext cx="1298278" cy="1919287"/>
           </a:xfrm>
           <a:prstGeom prst="rect">
@@ -3430,8 +3523,8 @@
         </p:blipFill>
         <p:spPr>
           <a:xfrm>
-            <a:off x="4480689" y="2163471"/>
-            <a:ext cx="1724154" cy="2531058"/>
+            <a:off x="5296795" y="2029253"/>
+            <a:ext cx="1448654" cy="2126624"/>
           </a:xfrm>
           <a:prstGeom prst="rect">
             <a:avLst/>
@@ -3466,7 +3559,7 @@
         </p:blipFill>
         <p:spPr>
           <a:xfrm>
-            <a:off x="7138851" y="3876652"/>
+            <a:off x="3732516" y="2298066"/>
             <a:ext cx="1310640" cy="1959864"/>
           </a:xfrm>
           <a:prstGeom prst="rect">
@@ -3502,7 +3595,7 @@
         </p:blipFill>
         <p:spPr>
           <a:xfrm>
-            <a:off x="1087605" y="3605463"/>
+            <a:off x="552797" y="3991692"/>
             <a:ext cx="2926080" cy="1644457"/>
           </a:xfrm>
           <a:prstGeom prst="rect">
@@ -3538,7 +3631,7 @@
         </p:blipFill>
         <p:spPr>
           <a:xfrm>
-            <a:off x="7683500" y="627951"/>
+            <a:off x="553618" y="219148"/>
             <a:ext cx="2926080" cy="1645920"/>
           </a:xfrm>
           <a:prstGeom prst="rect">
@@ -3574,7 +3667,7 @@
         </p:blipFill>
         <p:spPr>
           <a:xfrm>
-            <a:off x="553618" y="292732"/>
+            <a:off x="3732516" y="4389006"/>
             <a:ext cx="2244858" cy="1247143"/>
           </a:xfrm>
           <a:prstGeom prst="rect">
@@ -3610,7 +3703,7 @@
         </p:blipFill>
         <p:spPr>
           <a:xfrm>
-            <a:off x="5407202" y="358216"/>
+            <a:off x="5350574" y="270211"/>
             <a:ext cx="2712734" cy="1525913"/>
           </a:xfrm>
           <a:prstGeom prst="rect">
@@ -3646,8 +3739,8 @@
         </p:blipFill>
         <p:spPr>
           <a:xfrm>
-            <a:off x="8790409" y="3020299"/>
-            <a:ext cx="2038350" cy="3019425"/>
+            <a:off x="6883444" y="3429000"/>
+            <a:ext cx="1490000" cy="2207149"/>
           </a:xfrm>
           <a:prstGeom prst="rect">
             <a:avLst/>
@@ -3682,7 +3775,7 @@
         </p:blipFill>
         <p:spPr>
           <a:xfrm>
-            <a:off x="638777" y="1919286"/>
+            <a:off x="553618" y="1961231"/>
             <a:ext cx="2591815" cy="1601371"/>
           </a:xfrm>
           <a:prstGeom prst="rect">

</xml_diff>